<commit_message>
Update JobExportDS sample número fixo de linhas
</commit_message>
<xml_diff>
--- a/Documentação Projeto DataOps.pptx
+++ b/Documentação Projeto DataOps.pptx
@@ -4867,7 +4867,7 @@
             </a:r>
             <a:r>
               <a:rPr lang="pt-BR" dirty="0"/>
-              <a:t>  Faz um input dos dados das tabelas pertinentes com os requisitos que estão presentes no repositório da hierarquia </a:t>
+              <a:t>  Faz um input randômico de um número específico de linhas dos dados das tabelas pertinentes com os requisitos que estão presentes no repositório da hierarquia </a:t>
             </a:r>
             <a:r>
               <a:rPr lang="pt-BR" dirty="0" err="1"/>
@@ -9064,7 +9064,7 @@
       </p:grpSpPr>
       <p:sp>
         <p:nvSpPr>
-          <p:cNvPr id="17" name="Freeform: Shape 16">
+          <p:cNvPr id="26" name="Freeform: Shape 25">
             <a:extLst>
               <a:ext uri="{FF2B5EF4-FFF2-40B4-BE49-F238E27FC236}">
                 <a16:creationId xmlns:a16="http://schemas.microsoft.com/office/drawing/2014/main" id="{AE192E3E-68A9-4F36-936C-1C8D0B9EF132}"/>
@@ -9190,7 +9190,7 @@
       </p:sp>
       <p:sp useBgFill="1">
         <p:nvSpPr>
-          <p:cNvPr id="19" name="Rectangle 18">
+          <p:cNvPr id="28" name="Rectangle 27">
             <a:extLst>
               <a:ext uri="{FF2B5EF4-FFF2-40B4-BE49-F238E27FC236}">
                 <a16:creationId xmlns:a16="http://schemas.microsoft.com/office/drawing/2014/main" id="{998D6E90-577B-4973-B60A-2700290E68B3}"/>
@@ -9301,7 +9301,7 @@
       </p:sp>
       <p:sp>
         <p:nvSpPr>
-          <p:cNvPr id="21" name="Freeform: Shape 20">
+          <p:cNvPr id="30" name="Freeform: Shape 29">
             <a:extLst>
               <a:ext uri="{FF2B5EF4-FFF2-40B4-BE49-F238E27FC236}">
                 <a16:creationId xmlns:a16="http://schemas.microsoft.com/office/drawing/2014/main" id="{3FA95682-BEE6-4B33-BA34-7E7BE49782DA}"/>
@@ -9427,10 +9427,10 @@
       </p:sp>
       <p:pic>
         <p:nvPicPr>
-          <p:cNvPr id="5" name="Imagem 4">
-            <a:extLst>
-              <a:ext uri="{FF2B5EF4-FFF2-40B4-BE49-F238E27FC236}">
-                <a16:creationId xmlns:a16="http://schemas.microsoft.com/office/drawing/2014/main" id="{5F8B476A-B6C9-4D3B-AE9F-6E22DD0DAA71}"/>
+          <p:cNvPr id="4" name="Imagem 3">
+            <a:extLst>
+              <a:ext uri="{FF2B5EF4-FFF2-40B4-BE49-F238E27FC236}">
+                <a16:creationId xmlns:a16="http://schemas.microsoft.com/office/drawing/2014/main" id="{80AD9731-0905-455D-ADFA-A342EDEC3EE8}"/>
               </a:ext>
             </a:extLst>
           </p:cNvPr>
@@ -9447,8 +9447,8 @@
         </p:blipFill>
         <p:spPr>
           <a:xfrm>
-            <a:off x="4398097" y="1566037"/>
-            <a:ext cx="6737862" cy="3672134"/>
+            <a:off x="4398097" y="1439702"/>
+            <a:ext cx="6737862" cy="3924804"/>
           </a:xfrm>
           <a:prstGeom prst="rect">
             <a:avLst/>

</xml_diff>

<commit_message>
Update Report Sales Vendedores
</commit_message>
<xml_diff>
--- a/Documentação Projeto DataOps.pptx
+++ b/Documentação Projeto DataOps.pptx
@@ -9975,7 +9975,7 @@
       </p:grpSpPr>
       <p:sp>
         <p:nvSpPr>
-          <p:cNvPr id="21" name="Freeform: Shape 20">
+          <p:cNvPr id="30" name="Freeform: Shape 29">
             <a:extLst>
               <a:ext uri="{FF2B5EF4-FFF2-40B4-BE49-F238E27FC236}">
                 <a16:creationId xmlns:a16="http://schemas.microsoft.com/office/drawing/2014/main" id="{AE192E3E-68A9-4F36-936C-1C8D0B9EF132}"/>
@@ -10101,10 +10101,10 @@
       </p:sp>
       <p:sp useBgFill="1">
         <p:nvSpPr>
-          <p:cNvPr id="23" name="Rectangle 22">
-            <a:extLst>
-              <a:ext uri="{FF2B5EF4-FFF2-40B4-BE49-F238E27FC236}">
-                <a16:creationId xmlns:a16="http://schemas.microsoft.com/office/drawing/2014/main" id="{998D6E90-577B-4973-B60A-2700290E68B3}"/>
+          <p:cNvPr id="32" name="Rectangle 31">
+            <a:extLst>
+              <a:ext uri="{FF2B5EF4-FFF2-40B4-BE49-F238E27FC236}">
+                <a16:creationId xmlns:a16="http://schemas.microsoft.com/office/drawing/2014/main" id="{845648E2-B946-43A1-80DE-C50CBBDF92FA}"/>
               </a:ext>
               <a:ext uri="{C183D7F6-B498-43B3-948B-1728B52AA6E4}">
                 <adec:decorative xmlns:adec="http://schemas.microsoft.com/office/drawing/2017/decorative" val="1"/>
@@ -10194,17 +10194,17 @@
         <p:spPr>
           <a:xfrm>
             <a:off x="1084728" y="1597961"/>
-            <a:ext cx="2628969" cy="3162300"/>
-          </a:xfrm>
-        </p:spPr>
-        <p:txBody>
-          <a:bodyPr vert="horz" lIns="91440" tIns="45720" rIns="91440" bIns="45720" rtlCol="0" anchor="t">
+            <a:ext cx="3795812" cy="3162300"/>
+          </a:xfrm>
+        </p:spPr>
+        <p:txBody>
+          <a:bodyPr vert="horz" lIns="91440" tIns="45720" rIns="91440" bIns="45720" rtlCol="0" anchor="b">
             <a:normAutofit/>
           </a:bodyPr>
           <a:lstStyle/>
           <a:p>
             <a:r>
-              <a:rPr lang="en-US" sz="2400"/>
+              <a:rPr lang="en-US"/>
               <a:t>JobSalesReport – Antes da Execução</a:t>
             </a:r>
           </a:p>
@@ -10212,10 +10212,10 @@
       </p:sp>
       <p:sp>
         <p:nvSpPr>
-          <p:cNvPr id="25" name="Freeform: Shape 24">
-            <a:extLst>
-              <a:ext uri="{FF2B5EF4-FFF2-40B4-BE49-F238E27FC236}">
-                <a16:creationId xmlns:a16="http://schemas.microsoft.com/office/drawing/2014/main" id="{3FA95682-BEE6-4B33-BA34-7E7BE49782DA}"/>
+          <p:cNvPr id="34" name="Freeform: Shape 33">
+            <a:extLst>
+              <a:ext uri="{FF2B5EF4-FFF2-40B4-BE49-F238E27FC236}">
+                <a16:creationId xmlns:a16="http://schemas.microsoft.com/office/drawing/2014/main" id="{EA06546B-3E90-4E24-BD32-C6BFD1CD8D20}"/>
               </a:ext>
               <a:ext uri="{C183D7F6-B498-43B3-948B-1728B52AA6E4}">
                 <adec:decorative xmlns:adec="http://schemas.microsoft.com/office/drawing/2017/decorative" val="1"/>
@@ -10234,8 +10234,8 @@
           </p:nvPr>
         </p:nvSpPr>
         <p:spPr>
-          <a:xfrm>
-            <a:off x="8803792" y="3455896"/>
+          <a:xfrm rot="16200000">
+            <a:off x="8794726" y="-9066"/>
             <a:ext cx="3388208" cy="3406341"/>
           </a:xfrm>
           <a:custGeom>
@@ -10336,12 +10336,138 @@
           </a:p>
         </p:txBody>
       </p:sp>
+      <p:sp>
+        <p:nvSpPr>
+          <p:cNvPr id="36" name="Freeform: Shape 35">
+            <a:extLst>
+              <a:ext uri="{FF2B5EF4-FFF2-40B4-BE49-F238E27FC236}">
+                <a16:creationId xmlns:a16="http://schemas.microsoft.com/office/drawing/2014/main" id="{3FA95682-BEE6-4B33-BA34-7E7BE49782DA}"/>
+              </a:ext>
+              <a:ext uri="{C183D7F6-B498-43B3-948B-1728B52AA6E4}">
+                <adec:decorative xmlns:adec="http://schemas.microsoft.com/office/drawing/2017/decorative" val="1"/>
+              </a:ext>
+            </a:extLst>
+          </p:cNvPr>
+          <p:cNvSpPr>
+            <a:spLocks noGrp="1" noRot="1" noChangeAspect="1" noMove="1" noResize="1" noEditPoints="1" noAdjustHandles="1" noChangeArrowheads="1" noChangeShapeType="1" noTextEdit="1"/>
+          </p:cNvSpPr>
+          <p:nvPr>
+            <p:extLst>
+              <p:ext uri="{386F3935-93C4-4BCD-93E2-E3B085C9AB24}">
+                <p16:designElem xmlns:p16="http://schemas.microsoft.com/office/powerpoint/2015/main" val="1"/>
+              </p:ext>
+            </p:extLst>
+          </p:nvPr>
+        </p:nvSpPr>
+        <p:spPr>
+          <a:xfrm>
+            <a:off x="8803793" y="3455896"/>
+            <a:ext cx="3388208" cy="3406341"/>
+          </a:xfrm>
+          <a:custGeom>
+            <a:avLst/>
+            <a:gdLst>
+              <a:gd name="connsiteX0" fmla="*/ 3388058 w 3388208"/>
+              <a:gd name="connsiteY0" fmla="*/ 0 h 3406341"/>
+              <a:gd name="connsiteX1" fmla="*/ 3388208 w 3388208"/>
+              <a:gd name="connsiteY1" fmla="*/ 0 h 3406341"/>
+              <a:gd name="connsiteX2" fmla="*/ 3388208 w 3388208"/>
+              <a:gd name="connsiteY2" fmla="*/ 3406341 h 3406341"/>
+              <a:gd name="connsiteX3" fmla="*/ 0 w 3388208"/>
+              <a:gd name="connsiteY3" fmla="*/ 3406341 h 3406341"/>
+              <a:gd name="connsiteX4" fmla="*/ 79006 w 3388208"/>
+              <a:gd name="connsiteY4" fmla="*/ 3404386 h 3406341"/>
+              <a:gd name="connsiteX5" fmla="*/ 3383947 w 3388208"/>
+              <a:gd name="connsiteY5" fmla="*/ 164274 h 3406341"/>
+            </a:gdLst>
+            <a:ahLst/>
+            <a:cxnLst>
+              <a:cxn ang="0">
+                <a:pos x="connsiteX0" y="connsiteY0"/>
+              </a:cxn>
+              <a:cxn ang="0">
+                <a:pos x="connsiteX1" y="connsiteY1"/>
+              </a:cxn>
+              <a:cxn ang="0">
+                <a:pos x="connsiteX2" y="connsiteY2"/>
+              </a:cxn>
+              <a:cxn ang="0">
+                <a:pos x="connsiteX3" y="connsiteY3"/>
+              </a:cxn>
+              <a:cxn ang="0">
+                <a:pos x="connsiteX4" y="connsiteY4"/>
+              </a:cxn>
+              <a:cxn ang="0">
+                <a:pos x="connsiteX5" y="connsiteY5"/>
+              </a:cxn>
+            </a:cxnLst>
+            <a:rect l="l" t="t" r="r" b="b"/>
+            <a:pathLst>
+              <a:path w="3388208" h="3406341">
+                <a:moveTo>
+                  <a:pt x="3388058" y="0"/>
+                </a:moveTo>
+                <a:lnTo>
+                  <a:pt x="3388208" y="0"/>
+                </a:lnTo>
+                <a:lnTo>
+                  <a:pt x="3388208" y="3406341"/>
+                </a:lnTo>
+                <a:lnTo>
+                  <a:pt x="0" y="3406341"/>
+                </a:lnTo>
+                <a:lnTo>
+                  <a:pt x="79006" y="3404386"/>
+                </a:lnTo>
+                <a:cubicBezTo>
+                  <a:pt x="1864742" y="3315784"/>
+                  <a:pt x="3296223" y="1912901"/>
+                  <a:pt x="3383947" y="164274"/>
+                </a:cubicBezTo>
+                <a:close/>
+              </a:path>
+            </a:pathLst>
+          </a:custGeom>
+          <a:solidFill>
+            <a:schemeClr val="tx2"/>
+          </a:solidFill>
+          <a:ln>
+            <a:noFill/>
+          </a:ln>
+        </p:spPr>
+        <p:style>
+          <a:lnRef idx="2">
+            <a:schemeClr val="accent1">
+              <a:shade val="50000"/>
+            </a:schemeClr>
+          </a:lnRef>
+          <a:fillRef idx="1">
+            <a:schemeClr val="accent1"/>
+          </a:fillRef>
+          <a:effectRef idx="0">
+            <a:schemeClr val="accent1"/>
+          </a:effectRef>
+          <a:fontRef idx="minor">
+            <a:schemeClr val="lt1"/>
+          </a:fontRef>
+        </p:style>
+        <p:txBody>
+          <a:bodyPr wrap="square" rtlCol="0" anchor="ctr">
+            <a:noAutofit/>
+          </a:bodyPr>
+          <a:lstStyle/>
+          <a:p>
+            <a:pPr algn="ctr"/>
+            <a:endParaRPr lang="en-US"/>
+          </a:p>
+        </p:txBody>
+      </p:sp>
       <p:pic>
         <p:nvPicPr>
-          <p:cNvPr id="4" name="Imagem 3">
-            <a:extLst>
-              <a:ext uri="{FF2B5EF4-FFF2-40B4-BE49-F238E27FC236}">
-                <a16:creationId xmlns:a16="http://schemas.microsoft.com/office/drawing/2014/main" id="{D705F6F9-1AF6-41BB-929F-D729DEF7EB25}"/>
+          <p:cNvPr id="5" name="Imagem 4">
+            <a:extLst>
+              <a:ext uri="{FF2B5EF4-FFF2-40B4-BE49-F238E27FC236}">
+                <a16:creationId xmlns:a16="http://schemas.microsoft.com/office/drawing/2014/main" id="{AFAA15B9-D379-429D-BE7F-CE3A6524829B}"/>
               </a:ext>
             </a:extLst>
           </p:cNvPr>
@@ -10358,8 +10484,8 @@
         </p:blipFill>
         <p:spPr>
           <a:xfrm>
-            <a:off x="4398097" y="1793439"/>
-            <a:ext cx="6737862" cy="3217329"/>
+            <a:off x="5816082" y="1736718"/>
+            <a:ext cx="5309118" cy="3384562"/>
           </a:xfrm>
           <a:prstGeom prst="rect">
             <a:avLst/>
@@ -10406,7 +10532,7 @@
       </p:grpSpPr>
       <p:sp>
         <p:nvSpPr>
-          <p:cNvPr id="17" name="Freeform: Shape 16">
+          <p:cNvPr id="26" name="Freeform: Shape 25">
             <a:extLst>
               <a:ext uri="{FF2B5EF4-FFF2-40B4-BE49-F238E27FC236}">
                 <a16:creationId xmlns:a16="http://schemas.microsoft.com/office/drawing/2014/main" id="{AE192E3E-68A9-4F36-936C-1C8D0B9EF132}"/>
@@ -10532,7 +10658,7 @@
       </p:sp>
       <p:sp useBgFill="1">
         <p:nvSpPr>
-          <p:cNvPr id="19" name="Rectangle 18">
+          <p:cNvPr id="28" name="Rectangle 27">
             <a:extLst>
               <a:ext uri="{FF2B5EF4-FFF2-40B4-BE49-F238E27FC236}">
                 <a16:creationId xmlns:a16="http://schemas.microsoft.com/office/drawing/2014/main" id="{998D6E90-577B-4973-B60A-2700290E68B3}"/>
@@ -10643,7 +10769,7 @@
       </p:sp>
       <p:sp>
         <p:nvSpPr>
-          <p:cNvPr id="21" name="Freeform: Shape 20">
+          <p:cNvPr id="30" name="Freeform: Shape 29">
             <a:extLst>
               <a:ext uri="{FF2B5EF4-FFF2-40B4-BE49-F238E27FC236}">
                 <a16:creationId xmlns:a16="http://schemas.microsoft.com/office/drawing/2014/main" id="{3FA95682-BEE6-4B33-BA34-7E7BE49782DA}"/>
@@ -10769,10 +10895,10 @@
       </p:sp>
       <p:pic>
         <p:nvPicPr>
-          <p:cNvPr id="5" name="Imagem 4">
-            <a:extLst>
-              <a:ext uri="{FF2B5EF4-FFF2-40B4-BE49-F238E27FC236}">
-                <a16:creationId xmlns:a16="http://schemas.microsoft.com/office/drawing/2014/main" id="{7B8218CE-0A49-4A6D-A5E5-D134D55CC406}"/>
+          <p:cNvPr id="4" name="Imagem 3">
+            <a:extLst>
+              <a:ext uri="{FF2B5EF4-FFF2-40B4-BE49-F238E27FC236}">
+                <a16:creationId xmlns:a16="http://schemas.microsoft.com/office/drawing/2014/main" id="{3014EE2A-F961-41FB-8A5B-42BDFB45096D}"/>
               </a:ext>
             </a:extLst>
           </p:cNvPr>
@@ -10789,8 +10915,8 @@
         </p:blipFill>
         <p:spPr>
           <a:xfrm>
-            <a:off x="4398097" y="1608148"/>
-            <a:ext cx="6737862" cy="3587911"/>
+            <a:off x="4398097" y="1776595"/>
+            <a:ext cx="6737862" cy="3251018"/>
           </a:xfrm>
           <a:prstGeom prst="rect">
             <a:avLst/>

</xml_diff>